<commit_message>
Touched up powerpoint again
</commit_message>
<xml_diff>
--- a/DeRosa-Kawashima-ProjectPresentation.pptx
+++ b/DeRosa-Kawashima-ProjectPresentation.pptx
@@ -106,7 +106,127 @@
       </a:defRPr>
     </a:lvl9pPr>
   </p:defaultTextStyle>
+  <p:extLst>
+    <p:ext uri="{EFAFB233-063F-42B5-8137-9DF3F51BA10A}">
+      <p15:sldGuideLst xmlns:p15="http://schemas.microsoft.com/office/powerpoint/2012/main"/>
+    </p:ext>
+  </p:extLst>
 </p:presentation>
+</file>
+
+<file path=ppt/revisionInfo.xml><?xml version="1.0" encoding="utf-8"?>
+<p1510:revInfo xmlns:a="http://schemas.openxmlformats.org/drawingml/2006/main" xmlns:r="http://schemas.openxmlformats.org/officeDocument/2006/relationships" xmlns:p1510="http://schemas.microsoft.com/office/powerpoint/2015/10/main">
+  <p1510:revLst>
+    <p1510:client id="{22E79F71-215C-441F-9968-0D12F91838B2}" v="4" dt="2022-12-12T20:03:04.105"/>
+  </p1510:revLst>
+</p1510:revInfo>
+</file>
+
+<file path=ppt/changesInfos/changesInfo1.xml><?xml version="1.0" encoding="utf-8"?>
+<pc:chgInfo xmlns:a="http://schemas.openxmlformats.org/drawingml/2006/main" xmlns:r="http://schemas.openxmlformats.org/officeDocument/2006/relationships" xmlns:ac="http://schemas.microsoft.com/office/drawing/2013/main/command" xmlns:pc="http://schemas.microsoft.com/office/powerpoint/2013/main/command">
+  <pc:docChgLst>
+    <pc:chgData name="Amanda De Rosa" userId="b144f24a-dcb0-4ef0-873f-b8047b420803" providerId="ADAL" clId="{22E79F71-215C-441F-9968-0D12F91838B2}"/>
+    <pc:docChg chg="undo redo custSel modSld">
+      <pc:chgData name="Amanda De Rosa" userId="b144f24a-dcb0-4ef0-873f-b8047b420803" providerId="ADAL" clId="{22E79F71-215C-441F-9968-0D12F91838B2}" dt="2022-12-12T20:03:45.258" v="488" actId="1035"/>
+      <pc:docMkLst>
+        <pc:docMk/>
+      </pc:docMkLst>
+      <pc:sldChg chg="modSp mod">
+        <pc:chgData name="Amanda De Rosa" userId="b144f24a-dcb0-4ef0-873f-b8047b420803" providerId="ADAL" clId="{22E79F71-215C-441F-9968-0D12F91838B2}" dt="2022-12-12T19:57:16.551" v="149" actId="2711"/>
+        <pc:sldMkLst>
+          <pc:docMk/>
+          <pc:sldMk cId="3535046191" sldId="256"/>
+        </pc:sldMkLst>
+        <pc:spChg chg="mod">
+          <ac:chgData name="Amanda De Rosa" userId="b144f24a-dcb0-4ef0-873f-b8047b420803" providerId="ADAL" clId="{22E79F71-215C-441F-9968-0D12F91838B2}" dt="2022-12-12T19:57:02.523" v="146" actId="1076"/>
+          <ac:spMkLst>
+            <pc:docMk/>
+            <pc:sldMk cId="3535046191" sldId="256"/>
+            <ac:spMk id="2" creationId="{C153B60E-858B-1E91-8211-BE4137A49C04}"/>
+          </ac:spMkLst>
+        </pc:spChg>
+        <pc:spChg chg="mod">
+          <ac:chgData name="Amanda De Rosa" userId="b144f24a-dcb0-4ef0-873f-b8047b420803" providerId="ADAL" clId="{22E79F71-215C-441F-9968-0D12F91838B2}" dt="2022-12-12T19:57:16.551" v="149" actId="2711"/>
+          <ac:spMkLst>
+            <pc:docMk/>
+            <pc:sldMk cId="3535046191" sldId="256"/>
+            <ac:spMk id="3" creationId="{41FFD235-45B8-1DC3-07C8-7E7BFFAC370A}"/>
+          </ac:spMkLst>
+        </pc:spChg>
+      </pc:sldChg>
+      <pc:sldChg chg="addSp modSp mod">
+        <pc:chgData name="Amanda De Rosa" userId="b144f24a-dcb0-4ef0-873f-b8047b420803" providerId="ADAL" clId="{22E79F71-215C-441F-9968-0D12F91838B2}" dt="2022-12-12T20:02:26.350" v="441" actId="14100"/>
+        <pc:sldMkLst>
+          <pc:docMk/>
+          <pc:sldMk cId="1403349753" sldId="257"/>
+        </pc:sldMkLst>
+        <pc:spChg chg="mod">
+          <ac:chgData name="Amanda De Rosa" userId="b144f24a-dcb0-4ef0-873f-b8047b420803" providerId="ADAL" clId="{22E79F71-215C-441F-9968-0D12F91838B2}" dt="2022-12-12T19:57:27.322" v="150" actId="207"/>
+          <ac:spMkLst>
+            <pc:docMk/>
+            <pc:sldMk cId="1403349753" sldId="257"/>
+            <ac:spMk id="2" creationId="{EE89DE71-A98D-F642-A7A8-F0BFF62DEEF0}"/>
+          </ac:spMkLst>
+        </pc:spChg>
+        <pc:spChg chg="mod">
+          <ac:chgData name="Amanda De Rosa" userId="b144f24a-dcb0-4ef0-873f-b8047b420803" providerId="ADAL" clId="{22E79F71-215C-441F-9968-0D12F91838B2}" dt="2022-12-12T19:58:24.078" v="258" actId="20577"/>
+          <ac:spMkLst>
+            <pc:docMk/>
+            <pc:sldMk cId="1403349753" sldId="257"/>
+            <ac:spMk id="3" creationId="{494D0FAA-8A41-BC7D-C403-59FD7FBDC169}"/>
+          </ac:spMkLst>
+        </pc:spChg>
+        <pc:picChg chg="add mod ord">
+          <ac:chgData name="Amanda De Rosa" userId="b144f24a-dcb0-4ef0-873f-b8047b420803" providerId="ADAL" clId="{22E79F71-215C-441F-9968-0D12F91838B2}" dt="2022-12-12T20:02:26.350" v="441" actId="14100"/>
+          <ac:picMkLst>
+            <pc:docMk/>
+            <pc:sldMk cId="1403349753" sldId="257"/>
+            <ac:picMk id="5" creationId="{6F135311-83F7-495C-6A46-B212D27228AD}"/>
+          </ac:picMkLst>
+        </pc:picChg>
+      </pc:sldChg>
+      <pc:sldChg chg="addSp modSp mod">
+        <pc:chgData name="Amanda De Rosa" userId="b144f24a-dcb0-4ef0-873f-b8047b420803" providerId="ADAL" clId="{22E79F71-215C-441F-9968-0D12F91838B2}" dt="2022-12-12T20:03:45.258" v="488" actId="1035"/>
+        <pc:sldMkLst>
+          <pc:docMk/>
+          <pc:sldMk cId="216618904" sldId="258"/>
+        </pc:sldMkLst>
+        <pc:spChg chg="mod">
+          <ac:chgData name="Amanda De Rosa" userId="b144f24a-dcb0-4ef0-873f-b8047b420803" providerId="ADAL" clId="{22E79F71-215C-441F-9968-0D12F91838B2}" dt="2022-12-12T20:03:39.389" v="475" actId="1036"/>
+          <ac:spMkLst>
+            <pc:docMk/>
+            <pc:sldMk cId="216618904" sldId="258"/>
+            <ac:spMk id="2" creationId="{A2009FA4-0782-75A6-24EC-68E91539A854}"/>
+          </ac:spMkLst>
+        </pc:spChg>
+        <pc:spChg chg="add mod">
+          <ac:chgData name="Amanda De Rosa" userId="b144f24a-dcb0-4ef0-873f-b8047b420803" providerId="ADAL" clId="{22E79F71-215C-441F-9968-0D12F91838B2}" dt="2022-12-12T20:03:39.389" v="475" actId="1036"/>
+          <ac:spMkLst>
+            <pc:docMk/>
+            <pc:sldMk cId="216618904" sldId="258"/>
+            <ac:spMk id="3" creationId="{A9C6E69D-5120-D72B-4124-2F59895CF420}"/>
+          </ac:spMkLst>
+        </pc:spChg>
+        <pc:picChg chg="add mod ord">
+          <ac:chgData name="Amanda De Rosa" userId="b144f24a-dcb0-4ef0-873f-b8047b420803" providerId="ADAL" clId="{22E79F71-215C-441F-9968-0D12F91838B2}" dt="2022-12-12T20:03:45.258" v="488" actId="1035"/>
+          <ac:picMkLst>
+            <pc:docMk/>
+            <pc:sldMk cId="216618904" sldId="258"/>
+            <ac:picMk id="5" creationId="{040BCB13-E938-1511-2758-3BEE78125F72}"/>
+          </ac:picMkLst>
+        </pc:picChg>
+        <pc:picChg chg="add mod">
+          <ac:chgData name="Amanda De Rosa" userId="b144f24a-dcb0-4ef0-873f-b8047b420803" providerId="ADAL" clId="{22E79F71-215C-441F-9968-0D12F91838B2}" dt="2022-12-12T20:03:25.738" v="446" actId="14100"/>
+          <ac:picMkLst>
+            <pc:docMk/>
+            <pc:sldMk cId="216618904" sldId="258"/>
+            <ac:picMk id="7" creationId="{E8577BEF-3562-BD17-CC09-D409C5BE1425}"/>
+          </ac:picMkLst>
+        </pc:picChg>
+      </pc:sldChg>
+    </pc:docChg>
+  </pc:docChgLst>
+</pc:chgInfo>
 </file>
 
 <file path=ppt/slideLayouts/slideLayout1.xml><?xml version="1.0" encoding="utf-8"?>
@@ -4522,8 +4642,8 @@
         </p:nvSpPr>
         <p:spPr>
           <a:xfrm>
-            <a:off x="8842248" y="1481328"/>
-            <a:ext cx="2926080" cy="2468880"/>
+            <a:off x="8665754" y="1608785"/>
+            <a:ext cx="2577167" cy="2468880"/>
           </a:xfrm>
         </p:spPr>
         <p:txBody>
@@ -4534,8 +4654,52 @@
           <a:p>
             <a:pPr algn="l"/>
             <a:r>
-              <a:rPr lang="en-US" sz="4000"/>
-              <a:t>Welcome to the Tumor Study Organizer</a:t>
+              <a:rPr lang="en-US" sz="4000" dirty="0">
+                <a:solidFill>
+                  <a:srgbClr val="EE6C4D"/>
+                </a:solidFill>
+              </a:rPr>
+              <a:t>T</a:t>
+            </a:r>
+            <a:r>
+              <a:rPr lang="en-US" sz="4000" dirty="0">
+                <a:solidFill>
+                  <a:srgbClr val="3D5A80"/>
+                </a:solidFill>
+              </a:rPr>
+              <a:t>umor </a:t>
+            </a:r>
+            <a:r>
+              <a:rPr lang="en-US" sz="4000" dirty="0">
+                <a:solidFill>
+                  <a:srgbClr val="EE6C4D"/>
+                </a:solidFill>
+              </a:rPr>
+              <a:t>S</a:t>
+            </a:r>
+            <a:r>
+              <a:rPr lang="en-US" sz="4000" dirty="0">
+                <a:solidFill>
+                  <a:srgbClr val="3D5A80"/>
+                </a:solidFill>
+              </a:rPr>
+              <a:t>tudy </a:t>
+            </a:r>
+            <a:r>
+              <a:rPr lang="en-US" sz="4000" dirty="0">
+                <a:solidFill>
+                  <a:srgbClr val="EE6C4D"/>
+                </a:solidFill>
+              </a:rPr>
+              <a:t>O</a:t>
+            </a:r>
+            <a:r>
+              <a:rPr lang="en-US" sz="4000" dirty="0">
+                <a:solidFill>
+                  <a:srgbClr val="3D5A80"/>
+                </a:solidFill>
+              </a:rPr>
+              <a:t>rganizer</a:t>
             </a:r>
           </a:p>
         </p:txBody>
@@ -4558,8 +4722,8 @@
         </p:nvSpPr>
         <p:spPr>
           <a:xfrm>
-            <a:off x="8842248" y="4078224"/>
-            <a:ext cx="2926080" cy="1307592"/>
+            <a:off x="8644257" y="4115402"/>
+            <a:ext cx="3228640" cy="748562"/>
           </a:xfrm>
         </p:spPr>
         <p:txBody>
@@ -4570,8 +4734,8 @@
           <a:p>
             <a:pPr algn="l"/>
             <a:r>
-              <a:rPr lang="en-US" sz="2000"/>
-              <a:t>By James Kawashima and Amanda De Rosa</a:t>
+              <a:rPr lang="en-US" sz="2000" dirty="0"/>
+              <a:t>James Kawashima (2148113) Amanda De Rosa (2070441)</a:t>
             </a:r>
           </a:p>
         </p:txBody>
@@ -5063,6 +5227,42 @@
           <a:chExt cx="0" cy="0"/>
         </a:xfrm>
       </p:grpSpPr>
+      <p:pic>
+        <p:nvPicPr>
+          <p:cNvPr id="5" name="Picture 4" descr="Shape&#10;&#10;Description automatically generated with low confidence">
+            <a:extLst>
+              <a:ext uri="{FF2B5EF4-FFF2-40B4-BE49-F238E27FC236}">
+                <a16:creationId xmlns:a16="http://schemas.microsoft.com/office/drawing/2014/main" id="{6F135311-83F7-495C-6A46-B212D27228AD}"/>
+              </a:ext>
+            </a:extLst>
+          </p:cNvPr>
+          <p:cNvPicPr>
+            <a:picLocks noChangeAspect="1"/>
+          </p:cNvPicPr>
+          <p:nvPr/>
+        </p:nvPicPr>
+        <p:blipFill>
+          <a:blip r:embed="rId2">
+            <a:extLst>
+              <a:ext uri="{28A0092B-C50C-407E-A947-70E740481C1C}">
+                <a14:useLocalDpi xmlns:a14="http://schemas.microsoft.com/office/drawing/2010/main" val="0"/>
+              </a:ext>
+            </a:extLst>
+          </a:blip>
+          <a:stretch>
+            <a:fillRect/>
+          </a:stretch>
+        </p:blipFill>
+        <p:spPr>
+          <a:xfrm rot="5400000">
+            <a:off x="3070641" y="-2323681"/>
+            <a:ext cx="6127751" cy="11505364"/>
+          </a:xfrm>
+          <a:prstGeom prst="rect">
+            <a:avLst/>
+          </a:prstGeom>
+        </p:spPr>
+      </p:pic>
       <p:sp>
         <p:nvSpPr>
           <p:cNvPr id="2" name="Title 1">
@@ -5085,8 +5285,12 @@
           <a:lstStyle/>
           <a:p>
             <a:r>
-              <a:rPr lang="en-US" dirty="0"/>
-              <a:t>What does this App Do? </a:t>
+              <a:rPr lang="en-US" dirty="0">
+                <a:solidFill>
+                  <a:srgbClr val="EE6C4D"/>
+                </a:solidFill>
+              </a:rPr>
+              <a:t>What is TSO? </a:t>
             </a:r>
           </a:p>
         </p:txBody>
@@ -5109,38 +5313,138 @@
         </p:nvSpPr>
         <p:spPr/>
         <p:txBody>
-          <a:bodyPr/>
-          <a:lstStyle/>
-          <a:p>
-            <a:r>
-              <a:rPr lang="en-US" sz="1800" dirty="0">
+          <a:bodyPr>
+            <a:normAutofit/>
+          </a:bodyPr>
+          <a:lstStyle/>
+          <a:p>
+            <a:r>
+              <a:rPr lang="en-US" sz="2400" dirty="0">
+                <a:latin typeface="Calibri" panose="020F0502020204030204" pitchFamily="34" charset="0"/>
+                <a:ea typeface="Calibri" panose="020F0502020204030204" pitchFamily="34" charset="0"/>
+                <a:cs typeface="Times New Roman" panose="02020603050405020304" pitchFamily="18" charset="0"/>
+              </a:rPr>
+              <a:t>A</a:t>
+            </a:r>
+            <a:r>
+              <a:rPr lang="en-US" sz="2400" dirty="0">
                 <a:effectLst/>
                 <a:latin typeface="Calibri" panose="020F0502020204030204" pitchFamily="34" charset="0"/>
                 <a:ea typeface="Calibri" panose="020F0502020204030204" pitchFamily="34" charset="0"/>
                 <a:cs typeface="Times New Roman" panose="02020603050405020304" pitchFamily="18" charset="0"/>
               </a:rPr>
-              <a:t>The </a:t>
-            </a:r>
-            <a:r>
-              <a:rPr lang="en-US" sz="1800" b="1" dirty="0">
+              <a:t>n interactive database.</a:t>
+            </a:r>
+          </a:p>
+          <a:p>
+            <a:r>
+              <a:rPr lang="en-US" sz="2400" dirty="0">
+                <a:latin typeface="Calibri" panose="020F0502020204030204" pitchFamily="34" charset="0"/>
+                <a:ea typeface="Calibri" panose="020F0502020204030204" pitchFamily="34" charset="0"/>
+                <a:cs typeface="Times New Roman" panose="02020603050405020304" pitchFamily="18" charset="0"/>
+              </a:rPr>
+              <a:t>Made for pharmacologists specializing in oncology (cancer research) that experiment on mice.</a:t>
+            </a:r>
+            <a:endParaRPr lang="en-US" sz="2400" dirty="0">
+              <a:effectLst/>
+              <a:latin typeface="Calibri" panose="020F0502020204030204" pitchFamily="34" charset="0"/>
+              <a:ea typeface="Calibri" panose="020F0502020204030204" pitchFamily="34" charset="0"/>
+              <a:cs typeface="Times New Roman" panose="02020603050405020304" pitchFamily="18" charset="0"/>
+            </a:endParaRPr>
+          </a:p>
+          <a:p>
+            <a:r>
+              <a:rPr lang="en-US" sz="2400" dirty="0">
+                <a:latin typeface="Calibri" panose="020F0502020204030204" pitchFamily="34" charset="0"/>
+                <a:ea typeface="Calibri" panose="020F0502020204030204" pitchFamily="34" charset="0"/>
+                <a:cs typeface="Times New Roman" panose="02020603050405020304" pitchFamily="18" charset="0"/>
+              </a:rPr>
+              <a:t>A</a:t>
+            </a:r>
+            <a:r>
+              <a:rPr lang="en-US" sz="2400" dirty="0">
                 <a:effectLst/>
                 <a:latin typeface="Calibri" panose="020F0502020204030204" pitchFamily="34" charset="0"/>
                 <a:ea typeface="Calibri" panose="020F0502020204030204" pitchFamily="34" charset="0"/>
                 <a:cs typeface="Times New Roman" panose="02020603050405020304" pitchFamily="18" charset="0"/>
               </a:rPr>
-              <a:t>TSO</a:t>
-            </a:r>
-            <a:r>
-              <a:rPr lang="en-US" sz="1800" dirty="0">
+              <a:t>llows its users to organize information on :</a:t>
+            </a:r>
+          </a:p>
+          <a:p>
+            <a:pPr lvl="1"/>
+            <a:r>
+              <a:rPr lang="en-US" dirty="0">
                 <a:effectLst/>
                 <a:latin typeface="Calibri" panose="020F0502020204030204" pitchFamily="34" charset="0"/>
                 <a:ea typeface="Calibri" panose="020F0502020204030204" pitchFamily="34" charset="0"/>
                 <a:cs typeface="Times New Roman" panose="02020603050405020304" pitchFamily="18" charset="0"/>
               </a:rPr>
-              <a:t> (Tumor Study Organizer) is an invaluable piece of software for pharmacologists all around the world. This piece of software is an interactive database that allows its users to organize information on mice dosing, mice groups, group information, mice information, and which pharmacologist is responsible for which mouse. This manual will provide a useful explanation and demonstration on how the application works to provide the user with enough information to use it.</a:t>
-            </a:r>
-          </a:p>
-          <a:p>
+              <a:t>mice dosing</a:t>
+            </a:r>
+            <a:endParaRPr lang="en-US" dirty="0">
+              <a:latin typeface="Calibri" panose="020F0502020204030204" pitchFamily="34" charset="0"/>
+              <a:ea typeface="Calibri" panose="020F0502020204030204" pitchFamily="34" charset="0"/>
+              <a:cs typeface="Times New Roman" panose="02020603050405020304" pitchFamily="18" charset="0"/>
+            </a:endParaRPr>
+          </a:p>
+          <a:p>
+            <a:pPr lvl="1"/>
+            <a:r>
+              <a:rPr lang="en-US" dirty="0">
+                <a:effectLst/>
+                <a:latin typeface="Calibri" panose="020F0502020204030204" pitchFamily="34" charset="0"/>
+                <a:ea typeface="Calibri" panose="020F0502020204030204" pitchFamily="34" charset="0"/>
+                <a:cs typeface="Times New Roman" panose="02020603050405020304" pitchFamily="18" charset="0"/>
+              </a:rPr>
+              <a:t>mice groups</a:t>
+            </a:r>
+            <a:endParaRPr lang="en-US" dirty="0">
+              <a:latin typeface="Calibri" panose="020F0502020204030204" pitchFamily="34" charset="0"/>
+              <a:ea typeface="Calibri" panose="020F0502020204030204" pitchFamily="34" charset="0"/>
+              <a:cs typeface="Times New Roman" panose="02020603050405020304" pitchFamily="18" charset="0"/>
+            </a:endParaRPr>
+          </a:p>
+          <a:p>
+            <a:pPr lvl="1"/>
+            <a:r>
+              <a:rPr lang="en-US" dirty="0">
+                <a:effectLst/>
+                <a:latin typeface="Calibri" panose="020F0502020204030204" pitchFamily="34" charset="0"/>
+                <a:ea typeface="Calibri" panose="020F0502020204030204" pitchFamily="34" charset="0"/>
+                <a:cs typeface="Times New Roman" panose="02020603050405020304" pitchFamily="18" charset="0"/>
+              </a:rPr>
+              <a:t>mice information</a:t>
+            </a:r>
+          </a:p>
+          <a:p>
+            <a:pPr lvl="1"/>
+            <a:r>
+              <a:rPr lang="en-US" dirty="0">
+                <a:effectLst/>
+                <a:latin typeface="Calibri" panose="020F0502020204030204" pitchFamily="34" charset="0"/>
+                <a:ea typeface="Calibri" panose="020F0502020204030204" pitchFamily="34" charset="0"/>
+                <a:cs typeface="Times New Roman" panose="02020603050405020304" pitchFamily="18" charset="0"/>
+              </a:rPr>
+              <a:t>which pharmacologist is responsible for which </a:t>
+            </a:r>
+            <a:r>
+              <a:rPr lang="en-US" dirty="0">
+                <a:latin typeface="Calibri" panose="020F0502020204030204" pitchFamily="34" charset="0"/>
+                <a:ea typeface="Calibri" panose="020F0502020204030204" pitchFamily="34" charset="0"/>
+                <a:cs typeface="Times New Roman" panose="02020603050405020304" pitchFamily="18" charset="0"/>
+              </a:rPr>
+              <a:t>study</a:t>
+            </a:r>
+            <a:r>
+              <a:rPr lang="en-US" dirty="0">
+                <a:effectLst/>
+                <a:latin typeface="Calibri" panose="020F0502020204030204" pitchFamily="34" charset="0"/>
+                <a:ea typeface="Calibri" panose="020F0502020204030204" pitchFamily="34" charset="0"/>
+                <a:cs typeface="Times New Roman" panose="02020603050405020304" pitchFamily="18" charset="0"/>
+              </a:rPr>
+              <a:t>.</a:t>
+            </a:r>
             <a:endParaRPr lang="en-US" dirty="0"/>
           </a:p>
         </p:txBody>
@@ -5175,26 +5479,62 @@
           <a:chExt cx="0" cy="0"/>
         </a:xfrm>
       </p:grpSpPr>
-      <p:sp>
-        <p:nvSpPr>
-          <p:cNvPr id="2" name="Title 1">
-            <a:extLst>
-              <a:ext uri="{FF2B5EF4-FFF2-40B4-BE49-F238E27FC236}">
-                <a16:creationId xmlns:a16="http://schemas.microsoft.com/office/drawing/2014/main" id="{A2009FA4-0782-75A6-24EC-68E91539A854}"/>
-              </a:ext>
-            </a:extLst>
-          </p:cNvPr>
-          <p:cNvSpPr>
-            <a:spLocks noGrp="1"/>
-          </p:cNvSpPr>
-          <p:nvPr>
-            <p:ph type="title"/>
-          </p:nvPr>
-        </p:nvSpPr>
+      <p:pic>
+        <p:nvPicPr>
+          <p:cNvPr id="5" name="Picture 4" descr="A picture containing music, bowed instrument, guitar&#10;&#10;Description automatically generated">
+            <a:extLst>
+              <a:ext uri="{FF2B5EF4-FFF2-40B4-BE49-F238E27FC236}">
+                <a16:creationId xmlns:a16="http://schemas.microsoft.com/office/drawing/2014/main" id="{040BCB13-E938-1511-2758-3BEE78125F72}"/>
+              </a:ext>
+            </a:extLst>
+          </p:cNvPr>
+          <p:cNvPicPr>
+            <a:picLocks noChangeAspect="1"/>
+          </p:cNvPicPr>
+          <p:nvPr/>
+        </p:nvPicPr>
+        <p:blipFill>
+          <a:blip r:embed="rId2">
+            <a:extLst>
+              <a:ext uri="{28A0092B-C50C-407E-A947-70E740481C1C}">
+                <a14:useLocalDpi xmlns:a14="http://schemas.microsoft.com/office/drawing/2010/main" val="0"/>
+              </a:ext>
+            </a:extLst>
+          </a:blip>
+          <a:stretch>
+            <a:fillRect/>
+          </a:stretch>
+        </p:blipFill>
         <p:spPr>
           <a:xfrm>
-            <a:off x="1022758" y="2487539"/>
-            <a:ext cx="10515600" cy="1325563"/>
+            <a:off x="1519551" y="335639"/>
+            <a:ext cx="2628571" cy="6190476"/>
+          </a:xfrm>
+          <a:prstGeom prst="rect">
+            <a:avLst/>
+          </a:prstGeom>
+        </p:spPr>
+      </p:pic>
+      <p:sp>
+        <p:nvSpPr>
+          <p:cNvPr id="2" name="Title 1">
+            <a:extLst>
+              <a:ext uri="{FF2B5EF4-FFF2-40B4-BE49-F238E27FC236}">
+                <a16:creationId xmlns:a16="http://schemas.microsoft.com/office/drawing/2014/main" id="{A2009FA4-0782-75A6-24EC-68E91539A854}"/>
+              </a:ext>
+            </a:extLst>
+          </p:cNvPr>
+          <p:cNvSpPr>
+            <a:spLocks noGrp="1"/>
+          </p:cNvSpPr>
+          <p:nvPr>
+            <p:ph type="title"/>
+          </p:nvPr>
+        </p:nvSpPr>
+        <p:spPr>
+          <a:xfrm>
+            <a:off x="3783523" y="2235938"/>
+            <a:ext cx="7394641" cy="1325563"/>
           </a:xfrm>
         </p:spPr>
         <p:txBody>
@@ -5203,12 +5543,111 @@
           <a:p>
             <a:pPr algn="ctr"/>
             <a:r>
-              <a:rPr lang="en-US" dirty="0"/>
+              <a:rPr lang="en-US" dirty="0">
+                <a:solidFill>
+                  <a:srgbClr val="EE6C4D"/>
+                </a:solidFill>
+              </a:rPr>
               <a:t>Thanks for Listening!</a:t>
             </a:r>
           </a:p>
         </p:txBody>
       </p:sp>
+      <p:sp>
+        <p:nvSpPr>
+          <p:cNvPr id="3" name="Title 1">
+            <a:extLst>
+              <a:ext uri="{FF2B5EF4-FFF2-40B4-BE49-F238E27FC236}">
+                <a16:creationId xmlns:a16="http://schemas.microsoft.com/office/drawing/2014/main" id="{A9C6E69D-5120-D72B-4124-2F59895CF420}"/>
+              </a:ext>
+            </a:extLst>
+          </p:cNvPr>
+          <p:cNvSpPr txBox="1">
+            <a:spLocks/>
+          </p:cNvSpPr>
+          <p:nvPr/>
+        </p:nvSpPr>
+        <p:spPr>
+          <a:xfrm>
+            <a:off x="3783523" y="2897466"/>
+            <a:ext cx="7394641" cy="1325563"/>
+          </a:xfrm>
+          <a:prstGeom prst="rect">
+            <a:avLst/>
+          </a:prstGeom>
+        </p:spPr>
+        <p:txBody>
+          <a:bodyPr vert="horz" lIns="91440" tIns="45720" rIns="91440" bIns="45720" rtlCol="0" anchor="ctr">
+            <a:normAutofit/>
+          </a:bodyPr>
+          <a:lstStyle>
+            <a:lvl1pPr algn="l" defTabSz="914400" rtl="0" eaLnBrk="1" latinLnBrk="0" hangingPunct="1">
+              <a:lnSpc>
+                <a:spcPct val="90000"/>
+              </a:lnSpc>
+              <a:spcBef>
+                <a:spcPct val="0"/>
+              </a:spcBef>
+              <a:buNone/>
+              <a:defRPr sz="4400" kern="1200">
+                <a:solidFill>
+                  <a:schemeClr val="tx1"/>
+                </a:solidFill>
+                <a:latin typeface="+mj-lt"/>
+                <a:ea typeface="+mj-ea"/>
+                <a:cs typeface="+mj-cs"/>
+              </a:defRPr>
+            </a:lvl1pPr>
+          </a:lstStyle>
+          <a:p>
+            <a:pPr algn="ctr"/>
+            <a:r>
+              <a:rPr lang="en-US" dirty="0">
+                <a:solidFill>
+                  <a:srgbClr val="3D5A80"/>
+                </a:solidFill>
+              </a:rPr>
+              <a:t>Now time for the demo.</a:t>
+            </a:r>
+          </a:p>
+        </p:txBody>
+      </p:sp>
+      <p:pic>
+        <p:nvPicPr>
+          <p:cNvPr id="7" name="Picture 6">
+            <a:extLst>
+              <a:ext uri="{FF2B5EF4-FFF2-40B4-BE49-F238E27FC236}">
+                <a16:creationId xmlns:a16="http://schemas.microsoft.com/office/drawing/2014/main" id="{E8577BEF-3562-BD17-CC09-D409C5BE1425}"/>
+              </a:ext>
+            </a:extLst>
+          </p:cNvPr>
+          <p:cNvPicPr>
+            <a:picLocks noChangeAspect="1"/>
+          </p:cNvPicPr>
+          <p:nvPr/>
+        </p:nvPicPr>
+        <p:blipFill>
+          <a:blip r:embed="rId3">
+            <a:extLst>
+              <a:ext uri="{28A0092B-C50C-407E-A947-70E740481C1C}">
+                <a14:useLocalDpi xmlns:a14="http://schemas.microsoft.com/office/drawing/2010/main" val="0"/>
+              </a:ext>
+            </a:extLst>
+          </a:blip>
+          <a:stretch>
+            <a:fillRect/>
+          </a:stretch>
+        </p:blipFill>
+        <p:spPr>
+          <a:xfrm rot="5400000">
+            <a:off x="7814908" y="2877820"/>
+            <a:ext cx="7697037" cy="1057143"/>
+          </a:xfrm>
+          <a:prstGeom prst="rect">
+            <a:avLst/>
+          </a:prstGeom>
+        </p:spPr>
+      </p:pic>
     </p:spTree>
     <p:extLst>
       <p:ext uri="{BB962C8B-B14F-4D97-AF65-F5344CB8AC3E}">

</xml_diff>